<commit_message>
Add data visuals to deck, plus edits
</commit_message>
<xml_diff>
--- a/BuildingTableauDashboards.pptx
+++ b/BuildingTableauDashboards.pptx
@@ -9,12 +9,15 @@
     <p:sldId id="257" r:id="rId3"/>
     <p:sldId id="258" r:id="rId4"/>
     <p:sldId id="259" r:id="rId5"/>
-    <p:sldId id="260" r:id="rId6"/>
-    <p:sldId id="261" r:id="rId7"/>
-    <p:sldId id="262" r:id="rId8"/>
-    <p:sldId id="263" r:id="rId9"/>
-    <p:sldId id="264" r:id="rId10"/>
-    <p:sldId id="265" r:id="rId11"/>
+    <p:sldId id="266" r:id="rId6"/>
+    <p:sldId id="267" r:id="rId7"/>
+    <p:sldId id="268" r:id="rId8"/>
+    <p:sldId id="260" r:id="rId9"/>
+    <p:sldId id="261" r:id="rId10"/>
+    <p:sldId id="262" r:id="rId11"/>
+    <p:sldId id="263" r:id="rId12"/>
+    <p:sldId id="264" r:id="rId13"/>
+    <p:sldId id="265" r:id="rId14"/>
   </p:sldIdLst>
   <p:sldSz cx="12192000" cy="6858000"/>
   <p:notesSz cx="6858000" cy="9144000"/>
@@ -113,6 +116,11 @@
       </a:defRPr>
     </a:lvl9pPr>
   </p:defaultTextStyle>
+  <p:extLst>
+    <p:ext uri="{EFAFB233-063F-42B5-8137-9DF3F51BA10A}">
+      <p15:sldGuideLst xmlns:p15="http://schemas.microsoft.com/office/powerpoint/2012/main"/>
+    </p:ext>
+  </p:extLst>
 </p:presentation>
 </file>
 
@@ -6087,7 +6095,12 @@
             <p:ph type="ctrTitle"/>
           </p:nvPr>
         </p:nvSpPr>
-        <p:spPr/>
+        <p:spPr>
+          <a:xfrm>
+            <a:off x="1751012" y="737114"/>
+            <a:ext cx="8689976" cy="2509213"/>
+          </a:xfrm>
+        </p:spPr>
         <p:txBody>
           <a:bodyPr/>
           <a:lstStyle/>
@@ -6110,10 +6123,15 @@
             <p:ph type="subTitle" idx="1"/>
           </p:nvPr>
         </p:nvSpPr>
-        <p:spPr/>
+        <p:spPr>
+          <a:xfrm>
+            <a:off x="1751012" y="3246328"/>
+            <a:ext cx="8689976" cy="2753640"/>
+          </a:xfrm>
+        </p:spPr>
         <p:txBody>
           <a:bodyPr>
-            <a:normAutofit fontScale="92500" lnSpcReduction="10000"/>
+            <a:normAutofit fontScale="92500" lnSpcReduction="20000"/>
           </a:bodyPr>
           <a:lstStyle/>
           <a:p>
@@ -6130,32 +6148,83 @@
           </a:p>
           <a:p>
             <a:r>
-              <a:rPr lang="en-US" dirty="0" smtClean="0"/>
+              <a:rPr lang="en-US" b="1" dirty="0" smtClean="0"/>
               <a:t>Bob Hiltner </a:t>
             </a:r>
             <a:r>
-              <a:rPr lang="en-US" dirty="0" smtClean="0">
+              <a:rPr lang="en-US" b="1" cap="none" dirty="0" smtClean="0">
+                <a:solidFill>
+                  <a:schemeClr val="tx2"/>
+                </a:solidFill>
                 <a:hlinkClick r:id="rId2"/>
               </a:rPr>
               <a:t>bobhilt@gmail.com</a:t>
             </a:r>
             <a:r>
-              <a:rPr lang="en-US" dirty="0" smtClean="0"/>
+              <a:rPr lang="en-US" b="1" dirty="0" smtClean="0">
+                <a:solidFill>
+                  <a:schemeClr val="tx2"/>
+                </a:solidFill>
+              </a:rPr>
               <a:t> </a:t>
             </a:r>
-            <a:r>
-              <a:rPr lang="en-US" dirty="0" err="1" smtClean="0"/>
+          </a:p>
+          <a:p>
+            <a:r>
+              <a:rPr lang="en-US" b="1" cap="none" dirty="0" err="1" smtClean="0"/>
               <a:t>github.com</a:t>
             </a:r>
             <a:r>
-              <a:rPr lang="en-US" dirty="0" smtClean="0"/>
+              <a:rPr lang="en-US" b="1" cap="none" dirty="0" smtClean="0"/>
               <a:t>/</a:t>
             </a:r>
             <a:r>
-              <a:rPr lang="en-US" dirty="0" err="1" smtClean="0"/>
+              <a:rPr lang="en-US" b="1" cap="none" dirty="0" err="1" smtClean="0"/>
               <a:t>bobhilt</a:t>
             </a:r>
-            <a:endParaRPr lang="en-US" dirty="0"/>
+            <a:r>
+              <a:rPr lang="en-US" b="1" cap="none" dirty="0" smtClean="0"/>
+              <a:t>/tableau-dashboard-demo</a:t>
+            </a:r>
+          </a:p>
+          <a:p>
+            <a:r>
+              <a:rPr lang="en-US" b="1" cap="none" dirty="0"/>
+              <a:t>https://</a:t>
+            </a:r>
+            <a:r>
+              <a:rPr lang="en-US" b="1" cap="none" dirty="0" err="1"/>
+              <a:t>public.tableau.com</a:t>
+            </a:r>
+            <a:r>
+              <a:rPr lang="en-US" b="1" cap="none" dirty="0"/>
+              <a:t>/profile/</a:t>
+            </a:r>
+            <a:r>
+              <a:rPr lang="en-US" b="1" cap="none" dirty="0" err="1"/>
+              <a:t>bob.hiltner</a:t>
+            </a:r>
+            <a:r>
+              <a:rPr lang="en-US" b="1" cap="none" dirty="0"/>
+              <a:t>#!/</a:t>
+            </a:r>
+            <a:r>
+              <a:rPr lang="en-US" b="1" cap="none" dirty="0" err="1"/>
+              <a:t>vizhome</a:t>
+            </a:r>
+            <a:r>
+              <a:rPr lang="en-US" b="1" cap="none" dirty="0"/>
+              <a:t>/</a:t>
+            </a:r>
+            <a:r>
+              <a:rPr lang="en-US" b="1" cap="none" dirty="0" err="1"/>
+              <a:t>WorldHealthIndicators-HonoluluDataScienceTableauDemo</a:t>
+            </a:r>
+            <a:r>
+              <a:rPr lang="en-US" b="1" cap="none" dirty="0"/>
+              <a:t>/WorldHealthIndicators1960-2013?publish=yes</a:t>
+            </a:r>
+            <a:endParaRPr lang="en-US" b="1" cap="none" dirty="0"/>
           </a:p>
         </p:txBody>
       </p:sp>
@@ -6180,6 +6249,406 @@
 </file>
 
 <file path=ppt/slides/slide10.xml><?xml version="1.0" encoding="utf-8"?>
+<p:sld xmlns:a="http://schemas.openxmlformats.org/drawingml/2006/main" xmlns:r="http://schemas.openxmlformats.org/officeDocument/2006/relationships" xmlns:p="http://schemas.openxmlformats.org/presentationml/2006/main">
+  <p:cSld>
+    <p:spTree>
+      <p:nvGrpSpPr>
+        <p:cNvPr id="1" name=""/>
+        <p:cNvGrpSpPr/>
+        <p:nvPr/>
+      </p:nvGrpSpPr>
+      <p:grpSpPr>
+        <a:xfrm>
+          <a:off x="0" y="0"/>
+          <a:ext cx="0" cy="0"/>
+          <a:chOff x="0" y="0"/>
+          <a:chExt cx="0" cy="0"/>
+        </a:xfrm>
+      </p:grpSpPr>
+      <p:sp>
+        <p:nvSpPr>
+          <p:cNvPr id="2" name="Title 1"/>
+          <p:cNvSpPr>
+            <a:spLocks noGrp="1"/>
+          </p:cNvSpPr>
+          <p:nvPr>
+            <p:ph type="title"/>
+          </p:nvPr>
+        </p:nvSpPr>
+        <p:spPr/>
+        <p:txBody>
+          <a:bodyPr/>
+          <a:lstStyle/>
+          <a:p>
+            <a:r>
+              <a:rPr lang="en-US" dirty="0"/>
+              <a:t>Animation — changes over time using pages. </a:t>
+            </a:r>
+          </a:p>
+        </p:txBody>
+      </p:sp>
+      <p:sp>
+        <p:nvSpPr>
+          <p:cNvPr id="3" name="Content Placeholder 2"/>
+          <p:cNvSpPr>
+            <a:spLocks noGrp="1"/>
+          </p:cNvSpPr>
+          <p:nvPr>
+            <p:ph sz="quarter" idx="13"/>
+          </p:nvPr>
+        </p:nvSpPr>
+        <p:spPr/>
+        <p:txBody>
+          <a:bodyPr/>
+          <a:lstStyle/>
+          <a:p>
+            <a:r>
+              <a:rPr lang="en-US" dirty="0"/>
+              <a:t>    </a:t>
+            </a:r>
+            <a:r>
+              <a:rPr lang="en-US" dirty="0" smtClean="0"/>
+              <a:t>Speed Options (3)</a:t>
+            </a:r>
+            <a:endParaRPr lang="en-US" dirty="0"/>
+          </a:p>
+          <a:p>
+            <a:r>
+              <a:rPr lang="en-US" dirty="0"/>
+              <a:t>    Show </a:t>
+            </a:r>
+            <a:r>
+              <a:rPr lang="en-US" dirty="0" smtClean="0"/>
+              <a:t>History (several options)</a:t>
+            </a:r>
+            <a:endParaRPr lang="en-US" dirty="0"/>
+          </a:p>
+          <a:p>
+            <a:r>
+              <a:rPr lang="en-US" dirty="0"/>
+              <a:t>    Forward/Reverse</a:t>
+            </a:r>
+          </a:p>
+          <a:p>
+            <a:r>
+              <a:rPr lang="en-US" dirty="0"/>
+              <a:t>    </a:t>
+            </a:r>
+            <a:r>
+              <a:rPr lang="en-US" dirty="0" smtClean="0"/>
+              <a:t>Loop</a:t>
+            </a:r>
+          </a:p>
+          <a:p>
+            <a:r>
+              <a:rPr lang="en-US" dirty="0"/>
+              <a:t> </a:t>
+            </a:r>
+            <a:r>
+              <a:rPr lang="en-US" dirty="0" smtClean="0"/>
+              <a:t>   Trail format</a:t>
+            </a:r>
+            <a:endParaRPr lang="en-US" dirty="0"/>
+          </a:p>
+          <a:p>
+            <a:endParaRPr lang="en-US" dirty="0"/>
+          </a:p>
+        </p:txBody>
+      </p:sp>
+    </p:spTree>
+    <p:extLst>
+      <p:ext uri="{BB962C8B-B14F-4D97-AF65-F5344CB8AC3E}">
+        <p14:creationId xmlns:p14="http://schemas.microsoft.com/office/powerpoint/2010/main" val="113731409"/>
+      </p:ext>
+    </p:extLst>
+  </p:cSld>
+  <p:clrMapOvr>
+    <a:masterClrMapping/>
+  </p:clrMapOvr>
+  <p:timing>
+    <p:tnLst>
+      <p:par>
+        <p:cTn id="1" dur="indefinite" restart="never" nodeType="tmRoot"/>
+      </p:par>
+    </p:tnLst>
+  </p:timing>
+</p:sld>
+</file>
+
+<file path=ppt/slides/slide11.xml><?xml version="1.0" encoding="utf-8"?>
+<p:sld xmlns:a="http://schemas.openxmlformats.org/drawingml/2006/main" xmlns:r="http://schemas.openxmlformats.org/officeDocument/2006/relationships" xmlns:p="http://schemas.openxmlformats.org/presentationml/2006/main">
+  <p:cSld>
+    <p:spTree>
+      <p:nvGrpSpPr>
+        <p:cNvPr id="1" name=""/>
+        <p:cNvGrpSpPr/>
+        <p:nvPr/>
+      </p:nvGrpSpPr>
+      <p:grpSpPr>
+        <a:xfrm>
+          <a:off x="0" y="0"/>
+          <a:ext cx="0" cy="0"/>
+          <a:chOff x="0" y="0"/>
+          <a:chExt cx="0" cy="0"/>
+        </a:xfrm>
+      </p:grpSpPr>
+      <p:sp>
+        <p:nvSpPr>
+          <p:cNvPr id="2" name="Title 1"/>
+          <p:cNvSpPr>
+            <a:spLocks noGrp="1"/>
+          </p:cNvSpPr>
+          <p:nvPr>
+            <p:ph type="title"/>
+          </p:nvPr>
+        </p:nvSpPr>
+        <p:spPr/>
+        <p:txBody>
+          <a:bodyPr/>
+          <a:lstStyle/>
+          <a:p>
+            <a:r>
+              <a:rPr lang="en-US" dirty="0" smtClean="0"/>
+              <a:t>Create Dashboard</a:t>
+            </a:r>
+            <a:endParaRPr lang="en-US" dirty="0"/>
+          </a:p>
+        </p:txBody>
+      </p:sp>
+      <p:sp>
+        <p:nvSpPr>
+          <p:cNvPr id="3" name="Content Placeholder 2"/>
+          <p:cNvSpPr>
+            <a:spLocks noGrp="1"/>
+          </p:cNvSpPr>
+          <p:nvPr>
+            <p:ph sz="quarter" idx="13"/>
+          </p:nvPr>
+        </p:nvSpPr>
+        <p:spPr/>
+        <p:txBody>
+          <a:bodyPr/>
+          <a:lstStyle/>
+          <a:p>
+            <a:r>
+              <a:rPr lang="en-US" dirty="0" smtClean="0"/>
+              <a:t>Pick your size</a:t>
+            </a:r>
+          </a:p>
+          <a:p>
+            <a:pPr lvl="1"/>
+            <a:r>
+              <a:rPr lang="en-US" dirty="0" smtClean="0"/>
+              <a:t>Preset list</a:t>
+            </a:r>
+          </a:p>
+          <a:p>
+            <a:pPr lvl="1"/>
+            <a:r>
+              <a:rPr lang="en-US" dirty="0"/>
+              <a:t>Or Customize width, height</a:t>
+            </a:r>
+            <a:endParaRPr lang="en-US" dirty="0" smtClean="0"/>
+          </a:p>
+          <a:p>
+            <a:r>
+              <a:rPr lang="en-US" dirty="0" smtClean="0"/>
+              <a:t>Arrange </a:t>
+            </a:r>
+            <a:r>
+              <a:rPr lang="en-US" dirty="0" smtClean="0"/>
+              <a:t>cards for space, logical layout</a:t>
+            </a:r>
+            <a:endParaRPr lang="en-US" dirty="0" smtClean="0"/>
+          </a:p>
+          <a:p>
+            <a:r>
+              <a:rPr lang="en-US" dirty="0" smtClean="0"/>
+              <a:t>Sort z-order by region (must be </a:t>
+            </a:r>
+            <a:r>
+              <a:rPr lang="en-US" dirty="0" smtClean="0"/>
+              <a:t>dimension, not measure, </a:t>
+            </a:r>
+            <a:r>
+              <a:rPr lang="en-US" dirty="0" smtClean="0"/>
+              <a:t>so this is of limited use) </a:t>
+            </a:r>
+            <a:endParaRPr lang="en-US" dirty="0" smtClean="0"/>
+          </a:p>
+          <a:p>
+            <a:pPr lvl="1"/>
+            <a:r>
+              <a:rPr lang="en-US" dirty="0" smtClean="0"/>
+              <a:t>Can’t sort based on population, e.g.</a:t>
+            </a:r>
+            <a:endParaRPr lang="en-US" dirty="0"/>
+          </a:p>
+        </p:txBody>
+      </p:sp>
+    </p:spTree>
+    <p:extLst>
+      <p:ext uri="{BB962C8B-B14F-4D97-AF65-F5344CB8AC3E}">
+        <p14:creationId xmlns:p14="http://schemas.microsoft.com/office/powerpoint/2010/main" val="1153467743"/>
+      </p:ext>
+    </p:extLst>
+  </p:cSld>
+  <p:clrMapOvr>
+    <a:masterClrMapping/>
+  </p:clrMapOvr>
+  <p:timing>
+    <p:tnLst>
+      <p:par>
+        <p:cTn id="1" dur="indefinite" restart="never" nodeType="tmRoot"/>
+      </p:par>
+    </p:tnLst>
+  </p:timing>
+</p:sld>
+</file>
+
+<file path=ppt/slides/slide12.xml><?xml version="1.0" encoding="utf-8"?>
+<p:sld xmlns:a="http://schemas.openxmlformats.org/drawingml/2006/main" xmlns:r="http://schemas.openxmlformats.org/officeDocument/2006/relationships" xmlns:p="http://schemas.openxmlformats.org/presentationml/2006/main">
+  <p:cSld>
+    <p:spTree>
+      <p:nvGrpSpPr>
+        <p:cNvPr id="1" name=""/>
+        <p:cNvGrpSpPr/>
+        <p:nvPr/>
+      </p:nvGrpSpPr>
+      <p:grpSpPr>
+        <a:xfrm>
+          <a:off x="0" y="0"/>
+          <a:ext cx="0" cy="0"/>
+          <a:chOff x="0" y="0"/>
+          <a:chExt cx="0" cy="0"/>
+        </a:xfrm>
+      </p:grpSpPr>
+      <p:sp>
+        <p:nvSpPr>
+          <p:cNvPr id="2" name="Title 1"/>
+          <p:cNvSpPr>
+            <a:spLocks noGrp="1"/>
+          </p:cNvSpPr>
+          <p:nvPr>
+            <p:ph type="title"/>
+          </p:nvPr>
+        </p:nvSpPr>
+        <p:spPr/>
+        <p:txBody>
+          <a:bodyPr/>
+          <a:lstStyle/>
+          <a:p>
+            <a:r>
+              <a:rPr lang="en-US" dirty="0" smtClean="0"/>
+              <a:t>Review</a:t>
+            </a:r>
+            <a:endParaRPr lang="en-US" dirty="0"/>
+          </a:p>
+        </p:txBody>
+      </p:sp>
+      <p:sp>
+        <p:nvSpPr>
+          <p:cNvPr id="3" name="Content Placeholder 2"/>
+          <p:cNvSpPr>
+            <a:spLocks noGrp="1"/>
+          </p:cNvSpPr>
+          <p:nvPr>
+            <p:ph sz="quarter" idx="13"/>
+          </p:nvPr>
+        </p:nvSpPr>
+        <p:spPr/>
+        <p:txBody>
+          <a:bodyPr>
+            <a:normAutofit lnSpcReduction="10000"/>
+          </a:bodyPr>
+          <a:lstStyle/>
+          <a:p>
+            <a:r>
+              <a:rPr lang="en-US" sz="2800" b="1" dirty="0"/>
+              <a:t>DESIGN TO TELL A STORY</a:t>
+            </a:r>
+            <a:r>
+              <a:rPr lang="en-US" sz="2800" b="1" dirty="0" smtClean="0"/>
+              <a:t>!</a:t>
+            </a:r>
+          </a:p>
+          <a:p>
+            <a:r>
+              <a:rPr lang="en-US" dirty="0" smtClean="0"/>
+              <a:t>Data import, pivot</a:t>
+            </a:r>
+          </a:p>
+          <a:p>
+            <a:r>
+              <a:rPr lang="en-US" dirty="0" smtClean="0"/>
+              <a:t>Data Blends. </a:t>
+            </a:r>
+            <a:r>
+              <a:rPr lang="en-US" b="1" dirty="0" smtClean="0"/>
+              <a:t>Edit Relationships</a:t>
+            </a:r>
+            <a:r>
+              <a:rPr lang="en-US" dirty="0" smtClean="0"/>
+              <a:t>, </a:t>
+            </a:r>
+            <a:r>
+              <a:rPr lang="en-US" b="1" dirty="0" smtClean="0"/>
+              <a:t>Link Fields</a:t>
+            </a:r>
+          </a:p>
+          <a:p>
+            <a:r>
+              <a:rPr lang="en-US" dirty="0" smtClean="0"/>
+              <a:t>Lay out data elements (Data, Filters, Parameters) Tweak Aesthetics, usability</a:t>
+            </a:r>
+          </a:p>
+          <a:p>
+            <a:pPr lvl="1"/>
+            <a:r>
+              <a:rPr lang="en-US" dirty="0" smtClean="0"/>
+              <a:t>Color, size, font, tooltips, labels</a:t>
+            </a:r>
+          </a:p>
+          <a:p>
+            <a:r>
+              <a:rPr lang="en-US" dirty="0" smtClean="0"/>
+              <a:t>Dashboards</a:t>
+            </a:r>
+          </a:p>
+          <a:p>
+            <a:r>
+              <a:rPr lang="en-US" dirty="0" smtClean="0"/>
+              <a:t>Story (series of dashboards)</a:t>
+            </a:r>
+            <a:endParaRPr lang="en-US" dirty="0"/>
+          </a:p>
+          <a:p>
+            <a:pPr lvl="1"/>
+            <a:endParaRPr lang="en-US" dirty="0"/>
+          </a:p>
+        </p:txBody>
+      </p:sp>
+    </p:spTree>
+    <p:extLst>
+      <p:ext uri="{BB962C8B-B14F-4D97-AF65-F5344CB8AC3E}">
+        <p14:creationId xmlns:p14="http://schemas.microsoft.com/office/powerpoint/2010/main" val="2120960313"/>
+      </p:ext>
+    </p:extLst>
+  </p:cSld>
+  <p:clrMapOvr>
+    <a:masterClrMapping/>
+  </p:clrMapOvr>
+  <p:timing>
+    <p:tnLst>
+      <p:par>
+        <p:cTn id="1" dur="indefinite" restart="never" nodeType="tmRoot"/>
+      </p:par>
+    </p:tnLst>
+  </p:timing>
+</p:sld>
+</file>
+
+<file path=ppt/slides/slide13.xml><?xml version="1.0" encoding="utf-8"?>
 <p:sld xmlns:a="http://schemas.openxmlformats.org/drawingml/2006/main" xmlns:r="http://schemas.openxmlformats.org/officeDocument/2006/relationships" xmlns:p="http://schemas.openxmlformats.org/presentationml/2006/main">
   <p:cSld>
     <p:spTree>
@@ -6450,9 +6919,26 @@
           </a:p>
           <a:p>
             <a:r>
-              <a:rPr lang="en-US" dirty="0" smtClean="0"/>
-              <a:t>Relate 5 dimensions in 2-d dashboard</a:t>
-            </a:r>
+              <a:rPr lang="en-US" b="1" dirty="0" smtClean="0">
+                <a:solidFill>
+                  <a:srgbClr val="FF0000"/>
+                </a:solidFill>
+              </a:rPr>
+              <a:t>Relate 5 dimensions in 2-d </a:t>
+            </a:r>
+            <a:r>
+              <a:rPr lang="en-US" b="1" dirty="0" smtClean="0">
+                <a:solidFill>
+                  <a:srgbClr val="FF0000"/>
+                </a:solidFill>
+              </a:rPr>
+              <a:t>dashboard!</a:t>
+            </a:r>
+            <a:endParaRPr lang="en-US" b="1" dirty="0" smtClean="0">
+              <a:solidFill>
+                <a:srgbClr val="FF0000"/>
+              </a:solidFill>
+            </a:endParaRPr>
           </a:p>
           <a:p>
             <a:pPr lvl="1"/>
@@ -6511,8 +6997,13 @@
             </a:r>
             <a:r>
               <a:rPr lang="en-US" dirty="0" smtClean="0"/>
-              <a:t> Region</a:t>
-            </a:r>
+              <a:t> </a:t>
+            </a:r>
+            <a:r>
+              <a:rPr lang="en-US" dirty="0" smtClean="0"/>
+              <a:t>Region</a:t>
+            </a:r>
+            <a:endParaRPr lang="en-US" dirty="0" smtClean="0"/>
           </a:p>
           <a:p>
             <a:pPr lvl="1"/>
@@ -6526,7 +7017,18 @@
             </a:r>
             <a:r>
               <a:rPr lang="en-US" dirty="0" smtClean="0"/>
-              <a:t> animation over pages (optional data History trails)</a:t>
+              <a:t> animation over pages (optional data History trails</a:t>
+            </a:r>
+            <a:r>
+              <a:rPr lang="en-US" dirty="0" smtClean="0"/>
+              <a:t>)</a:t>
+            </a:r>
+          </a:p>
+          <a:p>
+            <a:pPr lvl="1"/>
+            <a:r>
+              <a:rPr lang="en-US" dirty="0" smtClean="0"/>
+              <a:t>Could also use shape for another dimension (doesn’t mean you should)</a:t>
             </a:r>
             <a:endParaRPr lang="en-US" dirty="0"/>
           </a:p>
@@ -6635,9 +7137,14 @@
           <a:p>
             <a:pPr lvl="1"/>
             <a:r>
-              <a:rPr lang="en-US" dirty="0" smtClean="0"/>
-              <a:t>Fields must be linked</a:t>
-            </a:r>
+              <a:rPr lang="en-US" b="1" dirty="0" smtClean="0"/>
+              <a:t>Fields must be </a:t>
+            </a:r>
+            <a:r>
+              <a:rPr lang="en-US" b="1" dirty="0" smtClean="0"/>
+              <a:t>linked!</a:t>
+            </a:r>
+            <a:endParaRPr lang="en-US" b="1" dirty="0" smtClean="0"/>
           </a:p>
           <a:p>
             <a:r>
@@ -6701,68 +7208,54 @@
           <a:lstStyle/>
           <a:p>
             <a:r>
-              <a:rPr lang="en-US" dirty="0"/>
-              <a:t>Begin adding data</a:t>
-            </a:r>
-            <a:endParaRPr lang="en-US" dirty="0"/>
-          </a:p>
-        </p:txBody>
-      </p:sp>
-      <p:sp>
-        <p:nvSpPr>
-          <p:cNvPr id="3" name="Content Placeholder 2"/>
-          <p:cNvSpPr>
-            <a:spLocks noGrp="1"/>
-          </p:cNvSpPr>
+              <a:rPr lang="en-US" dirty="0" smtClean="0"/>
+              <a:t>Tabular-</a:t>
+            </a:r>
+            <a:r>
+              <a:rPr lang="en-US" dirty="0" err="1" smtClean="0"/>
+              <a:t>Denormalize</a:t>
+            </a:r>
+            <a:r>
+              <a:rPr lang="en-US" dirty="0" smtClean="0"/>
+              <a:t> (pivot) years</a:t>
+            </a:r>
+            <a:endParaRPr lang="en-US" dirty="0"/>
+          </a:p>
+        </p:txBody>
+      </p:sp>
+      <p:pic>
+        <p:nvPicPr>
+          <p:cNvPr id="4" name="Content Placeholder 3"/>
+          <p:cNvPicPr>
+            <a:picLocks noGrp="1" noChangeAspect="1"/>
+          </p:cNvPicPr>
           <p:nvPr>
             <p:ph sz="quarter" idx="13"/>
           </p:nvPr>
-        </p:nvSpPr>
-        <p:spPr/>
-        <p:txBody>
-          <a:bodyPr/>
-          <a:lstStyle/>
-          <a:p>
-            <a:r>
-              <a:rPr lang="en-US" dirty="0"/>
-              <a:t>    Rows:         Fertility Rate</a:t>
-            </a:r>
-          </a:p>
-          <a:p>
-            <a:r>
-              <a:rPr lang="en-US" dirty="0"/>
-              <a:t>    Columns:    Life Expectancy at Birth</a:t>
-            </a:r>
-          </a:p>
-          <a:p>
-            <a:r>
-              <a:rPr lang="en-US" dirty="0"/>
-              <a:t>    Size:            Population</a:t>
-            </a:r>
-          </a:p>
-          <a:p>
-            <a:r>
-              <a:rPr lang="en-US" dirty="0"/>
-              <a:t>    Detail:         Country Name</a:t>
-            </a:r>
-          </a:p>
-          <a:p>
-            <a:r>
-              <a:rPr lang="en-US" dirty="0"/>
-              <a:t>    Filter:          </a:t>
-            </a:r>
-            <a:r>
-              <a:rPr lang="en-US" dirty="0" smtClean="0"/>
-              <a:t>Region, Year</a:t>
-            </a:r>
-            <a:endParaRPr lang="en-US" dirty="0"/>
-          </a:p>
-        </p:txBody>
-      </p:sp>
+        </p:nvPicPr>
+        <p:blipFill>
+          <a:blip r:embed="rId2">
+            <a:extLst>
+              <a:ext uri="{28A0092B-C50C-407E-A947-70E740481C1C}">
+                <a14:useLocalDpi xmlns:a14="http://schemas.microsoft.com/office/drawing/2010/main" val="0"/>
+              </a:ext>
+            </a:extLst>
+          </a:blip>
+          <a:stretch>
+            <a:fillRect/>
+          </a:stretch>
+        </p:blipFill>
+        <p:spPr>
+          <a:xfrm>
+            <a:off x="1148555" y="1845733"/>
+            <a:ext cx="11778679" cy="5317067"/>
+          </a:xfrm>
+        </p:spPr>
+      </p:pic>
     </p:spTree>
     <p:extLst>
       <p:ext uri="{BB962C8B-B14F-4D97-AF65-F5344CB8AC3E}">
-        <p14:creationId xmlns:p14="http://schemas.microsoft.com/office/powerpoint/2010/main" val="190184892"/>
+        <p14:creationId xmlns:p14="http://schemas.microsoft.com/office/powerpoint/2010/main" val="1296144521"/>
       </p:ext>
     </p:extLst>
   </p:cSld>
@@ -6811,80 +7304,43 @@
           <a:bodyPr/>
           <a:lstStyle/>
           <a:p>
-            <a:r>
-              <a:rPr lang="en-US" dirty="0" smtClean="0"/>
-              <a:t>Aesthetic </a:t>
-            </a:r>
-            <a:r>
-              <a:rPr lang="en-US" dirty="0"/>
-              <a:t>/ User-friendly changes</a:t>
-            </a:r>
-          </a:p>
-        </p:txBody>
-      </p:sp>
-      <p:sp>
-        <p:nvSpPr>
-          <p:cNvPr id="3" name="Content Placeholder 2"/>
-          <p:cNvSpPr>
-            <a:spLocks noGrp="1"/>
-          </p:cNvSpPr>
+            <a:endParaRPr lang="en-US"/>
+          </a:p>
+        </p:txBody>
+      </p:sp>
+      <p:pic>
+        <p:nvPicPr>
+          <p:cNvPr id="4" name="Content Placeholder 3"/>
+          <p:cNvPicPr>
+            <a:picLocks noGrp="1" noChangeAspect="1"/>
+          </p:cNvPicPr>
           <p:nvPr>
             <p:ph sz="quarter" idx="13"/>
           </p:nvPr>
-        </p:nvSpPr>
-        <p:spPr/>
-        <p:txBody>
-          <a:bodyPr/>
-          <a:lstStyle/>
-          <a:p>
-            <a:r>
-              <a:rPr lang="en-US" dirty="0" smtClean="0"/>
-              <a:t>    Annotation </a:t>
-            </a:r>
-            <a:r>
-              <a:rPr lang="en-US" dirty="0"/>
-              <a:t>with page name</a:t>
-            </a:r>
-          </a:p>
-          <a:p>
-            <a:r>
-              <a:rPr lang="en-US" dirty="0"/>
-              <a:t>    Sorting by Region to set z-order (Dimensions only)</a:t>
-            </a:r>
-          </a:p>
-          <a:p>
-            <a:r>
-              <a:rPr lang="en-US" dirty="0"/>
-              <a:t>    Title</a:t>
-            </a:r>
-          </a:p>
-          <a:p>
-            <a:r>
-              <a:rPr lang="en-US" dirty="0"/>
-              <a:t>    Dashboard (Size)</a:t>
-            </a:r>
-          </a:p>
-          <a:p>
-            <a:r>
-              <a:rPr lang="en-US" dirty="0"/>
-              <a:t>    Turn of tooltip commands</a:t>
-            </a:r>
-          </a:p>
-          <a:p>
-            <a:r>
-              <a:rPr lang="en-US" dirty="0"/>
-              <a:t>    Set axis ranges</a:t>
-            </a:r>
-          </a:p>
-          <a:p>
-            <a:endParaRPr lang="en-US" dirty="0"/>
-          </a:p>
-        </p:txBody>
-      </p:sp>
+        </p:nvPicPr>
+        <p:blipFill>
+          <a:blip r:embed="rId2">
+            <a:extLst>
+              <a:ext uri="{28A0092B-C50C-407E-A947-70E740481C1C}">
+                <a14:useLocalDpi xmlns:a14="http://schemas.microsoft.com/office/drawing/2010/main" val="0"/>
+              </a:ext>
+            </a:extLst>
+          </a:blip>
+          <a:stretch>
+            <a:fillRect/>
+          </a:stretch>
+        </p:blipFill>
+        <p:spPr>
+          <a:xfrm>
+            <a:off x="543537" y="965201"/>
+            <a:ext cx="10276863" cy="5763376"/>
+          </a:xfrm>
+        </p:spPr>
+      </p:pic>
     </p:spTree>
     <p:extLst>
       <p:ext uri="{BB962C8B-B14F-4D97-AF65-F5344CB8AC3E}">
-        <p14:creationId xmlns:p14="http://schemas.microsoft.com/office/powerpoint/2010/main" val="1502686109"/>
+        <p14:creationId xmlns:p14="http://schemas.microsoft.com/office/powerpoint/2010/main" val="2140064875"/>
       </p:ext>
     </p:extLst>
   </p:cSld>
@@ -6933,57 +7389,65 @@
           <a:bodyPr/>
           <a:lstStyle/>
           <a:p>
-            <a:r>
-              <a:rPr lang="en-US" dirty="0"/>
-              <a:t>Animation — changes over time using pages. </a:t>
-            </a:r>
-          </a:p>
-        </p:txBody>
-      </p:sp>
-      <p:sp>
-        <p:nvSpPr>
-          <p:cNvPr id="3" name="Content Placeholder 2"/>
-          <p:cNvSpPr>
-            <a:spLocks noGrp="1"/>
-          </p:cNvSpPr>
+            <a:endParaRPr lang="en-US"/>
+          </a:p>
+        </p:txBody>
+      </p:sp>
+      <p:pic>
+        <p:nvPicPr>
+          <p:cNvPr id="4" name="Content Placeholder 3"/>
+          <p:cNvPicPr>
+            <a:picLocks noGrp="1" noChangeAspect="1"/>
+          </p:cNvPicPr>
           <p:nvPr>
             <p:ph sz="quarter" idx="13"/>
           </p:nvPr>
-        </p:nvSpPr>
-        <p:spPr/>
-        <p:txBody>
-          <a:bodyPr/>
-          <a:lstStyle/>
-          <a:p>
-            <a:r>
-              <a:rPr lang="en-US" dirty="0"/>
-              <a:t>    Speed</a:t>
-            </a:r>
-          </a:p>
-          <a:p>
-            <a:r>
-              <a:rPr lang="en-US" dirty="0"/>
-              <a:t>    Show </a:t>
-            </a:r>
+        </p:nvPicPr>
+        <p:blipFill>
+          <a:blip r:embed="rId2">
+            <a:extLst>
+              <a:ext uri="{28A0092B-C50C-407E-A947-70E740481C1C}">
+                <a14:useLocalDpi xmlns:a14="http://schemas.microsoft.com/office/drawing/2010/main" val="0"/>
+              </a:ext>
+            </a:extLst>
+          </a:blip>
+          <a:stretch>
+            <a:fillRect/>
+          </a:stretch>
+        </p:blipFill>
+        <p:spPr>
+          <a:xfrm>
+            <a:off x="913775" y="104948"/>
+            <a:ext cx="8027792" cy="6888148"/>
+          </a:xfrm>
+        </p:spPr>
+      </p:pic>
+      <p:sp>
+        <p:nvSpPr>
+          <p:cNvPr id="5" name="TextBox 4"/>
+          <p:cNvSpPr txBox="1"/>
+          <p:nvPr/>
+        </p:nvSpPr>
+        <p:spPr>
+          <a:xfrm>
+            <a:off x="9169052" y="2956142"/>
+            <a:ext cx="2780778" cy="646331"/>
+          </a:xfrm>
+          <a:prstGeom prst="rect">
+            <a:avLst/>
+          </a:prstGeom>
+          <a:noFill/>
+        </p:spPr>
+        <p:txBody>
+          <a:bodyPr wrap="square" rtlCol="0">
+            <a:spAutoFit/>
+          </a:bodyPr>
+          <a:lstStyle/>
+          <a:p>
             <a:r>
               <a:rPr lang="en-US" dirty="0" smtClean="0"/>
-              <a:t>History (several options)</a:t>
-            </a:r>
-            <a:endParaRPr lang="en-US" dirty="0"/>
-          </a:p>
-          <a:p>
-            <a:r>
-              <a:rPr lang="en-US" dirty="0"/>
-              <a:t>    Forward/Reverse</a:t>
-            </a:r>
-          </a:p>
-          <a:p>
-            <a:r>
-              <a:rPr lang="en-US" dirty="0"/>
-              <a:t>    Loop</a:t>
-            </a:r>
-          </a:p>
-          <a:p>
+              <a:t>Blend on country code (and year where applicable)</a:t>
+            </a:r>
             <a:endParaRPr lang="en-US" dirty="0"/>
           </a:p>
         </p:txBody>
@@ -6991,7 +7455,7 @@
     </p:spTree>
     <p:extLst>
       <p:ext uri="{BB962C8B-B14F-4D97-AF65-F5344CB8AC3E}">
-        <p14:creationId xmlns:p14="http://schemas.microsoft.com/office/powerpoint/2010/main" val="113731409"/>
+        <p14:creationId xmlns:p14="http://schemas.microsoft.com/office/powerpoint/2010/main" val="2014234169"/>
       </p:ext>
     </p:extLst>
   </p:cSld>
@@ -7041,57 +7505,80 @@
           <a:lstStyle/>
           <a:p>
             <a:r>
+              <a:rPr lang="en-US" dirty="0"/>
+              <a:t>Begin adding data</a:t>
+            </a:r>
+          </a:p>
+        </p:txBody>
+      </p:sp>
+      <p:sp>
+        <p:nvSpPr>
+          <p:cNvPr id="3" name="Content Placeholder 2"/>
+          <p:cNvSpPr>
+            <a:spLocks noGrp="1"/>
+          </p:cNvSpPr>
+          <p:nvPr>
+            <p:ph sz="quarter" idx="13"/>
+          </p:nvPr>
+        </p:nvSpPr>
+        <p:spPr/>
+        <p:txBody>
+          <a:bodyPr/>
+          <a:lstStyle/>
+          <a:p>
+            <a:r>
+              <a:rPr lang="en-US" dirty="0"/>
+              <a:t>    Rows:         </a:t>
+            </a:r>
+            <a:r>
+              <a:rPr lang="en-US" dirty="0"/>
+              <a:t>Life Expectancy at </a:t>
+            </a:r>
+            <a:r>
               <a:rPr lang="en-US" dirty="0" smtClean="0"/>
-              <a:t>Create Dashboard</a:t>
-            </a:r>
-            <a:endParaRPr lang="en-US" dirty="0"/>
-          </a:p>
-        </p:txBody>
-      </p:sp>
-      <p:sp>
-        <p:nvSpPr>
-          <p:cNvPr id="3" name="Content Placeholder 2"/>
-          <p:cNvSpPr>
-            <a:spLocks noGrp="1"/>
-          </p:cNvSpPr>
-          <p:nvPr>
-            <p:ph sz="quarter" idx="13"/>
-          </p:nvPr>
-        </p:nvSpPr>
-        <p:spPr/>
-        <p:txBody>
-          <a:bodyPr/>
-          <a:lstStyle/>
-          <a:p>
+              <a:t>Birth</a:t>
+            </a:r>
+            <a:endParaRPr lang="en-US" dirty="0" smtClean="0"/>
+          </a:p>
+          <a:p>
+            <a:r>
+              <a:rPr lang="en-US" dirty="0"/>
+              <a:t>    Columns:   </a:t>
+            </a:r>
             <a:r>
               <a:rPr lang="en-US" dirty="0" smtClean="0"/>
-              <a:t>Pick your size</a:t>
-            </a:r>
-          </a:p>
-          <a:p>
-            <a:pPr lvl="1"/>
+              <a:t>Fertility </a:t>
+            </a:r>
+            <a:r>
+              <a:rPr lang="en-US" dirty="0"/>
+              <a:t>Rate</a:t>
+            </a:r>
+          </a:p>
+          <a:p>
+            <a:r>
+              <a:rPr lang="en-US" dirty="0"/>
+              <a:t>    Size:            </a:t>
+            </a:r>
             <a:r>
               <a:rPr lang="en-US" dirty="0" smtClean="0"/>
-              <a:t>Preset list</a:t>
-            </a:r>
-          </a:p>
-          <a:p>
-            <a:pPr lvl="1"/>
+              <a:t> Population</a:t>
+            </a:r>
+            <a:endParaRPr lang="en-US" dirty="0"/>
+          </a:p>
+          <a:p>
+            <a:r>
+              <a:rPr lang="en-US" dirty="0"/>
+              <a:t>    Detail:         Country Name</a:t>
+            </a:r>
+          </a:p>
+          <a:p>
+            <a:r>
+              <a:rPr lang="en-US" dirty="0"/>
+              <a:t>    Filter:          </a:t>
+            </a:r>
             <a:r>
               <a:rPr lang="en-US" dirty="0" smtClean="0"/>
-              <a:t>Customer height, width</a:t>
-            </a:r>
-          </a:p>
-          <a:p>
-            <a:r>
-              <a:rPr lang="en-US" dirty="0" smtClean="0"/>
-              <a:t>Arrange cards</a:t>
-            </a:r>
-          </a:p>
-          <a:p>
-            <a:r>
-              <a:rPr lang="en-US" dirty="0" smtClean="0"/>
-              <a:t>Sort z-order by region (must be dimension, so this is of limited use) </a:t>
+              <a:t>Region, Year</a:t>
             </a:r>
             <a:endParaRPr lang="en-US" dirty="0"/>
           </a:p>
@@ -7100,7 +7587,7 @@
     </p:spTree>
     <p:extLst>
       <p:ext uri="{BB962C8B-B14F-4D97-AF65-F5344CB8AC3E}">
-        <p14:creationId xmlns:p14="http://schemas.microsoft.com/office/powerpoint/2010/main" val="1153467743"/>
+        <p14:creationId xmlns:p14="http://schemas.microsoft.com/office/powerpoint/2010/main" val="190184892"/>
       </p:ext>
     </p:extLst>
   </p:cSld>
@@ -7151,9 +7638,12 @@
           <a:p>
             <a:r>
               <a:rPr lang="en-US" dirty="0" smtClean="0"/>
-              <a:t>Review</a:t>
-            </a:r>
-            <a:endParaRPr lang="en-US" dirty="0"/>
+              <a:t>Aesthetic </a:t>
+            </a:r>
+            <a:r>
+              <a:rPr lang="en-US" dirty="0"/>
+              <a:t>/ User-friendly changes</a:t>
+            </a:r>
           </a:p>
         </p:txBody>
       </p:sp>
@@ -7169,72 +7659,93 @@
         </p:nvSpPr>
         <p:spPr/>
         <p:txBody>
-          <a:bodyPr>
-            <a:normAutofit lnSpcReduction="10000"/>
-          </a:bodyPr>
-          <a:lstStyle/>
-          <a:p>
-            <a:r>
-              <a:rPr lang="en-US" sz="2800" b="1" dirty="0"/>
-              <a:t>DESIGN TO TELL A STORY</a:t>
-            </a:r>
-            <a:r>
-              <a:rPr lang="en-US" sz="2800" b="1" dirty="0" smtClean="0"/>
-              <a:t>!</a:t>
-            </a:r>
-          </a:p>
+          <a:bodyPr/>
+          <a:lstStyle/>
           <a:p>
             <a:r>
               <a:rPr lang="en-US" dirty="0" smtClean="0"/>
-              <a:t>Data import, pivot</a:t>
-            </a:r>
-          </a:p>
-          <a:p>
+              <a:t>    Annotation </a:t>
+            </a:r>
+            <a:r>
+              <a:rPr lang="en-US" dirty="0"/>
+              <a:t>with page name</a:t>
+            </a:r>
+          </a:p>
+          <a:p>
+            <a:r>
+              <a:rPr lang="en-US" dirty="0"/>
+              <a:t>    Sorting by Region to set z-order (Dimensions only)</a:t>
+            </a:r>
+          </a:p>
+          <a:p>
+            <a:r>
+              <a:rPr lang="en-US" dirty="0"/>
+              <a:t>    Title</a:t>
+            </a:r>
+          </a:p>
+          <a:p>
+            <a:r>
+              <a:rPr lang="en-US" dirty="0"/>
+              <a:t>    Dashboard (Size)</a:t>
+            </a:r>
+          </a:p>
+          <a:p>
+            <a:r>
+              <a:rPr lang="en-US" dirty="0"/>
+              <a:t>    Turn </a:t>
+            </a:r>
             <a:r>
               <a:rPr lang="en-US" dirty="0" smtClean="0"/>
-              <a:t>Data Blends. </a:t>
-            </a:r>
-            <a:r>
-              <a:rPr lang="en-US" b="1" dirty="0" smtClean="0"/>
-              <a:t>Edit Relationships</a:t>
+              <a:t>off </a:t>
+            </a:r>
+            <a:r>
+              <a:rPr lang="en-US" dirty="0"/>
+              <a:t>tooltip </a:t>
             </a:r>
             <a:r>
               <a:rPr lang="en-US" dirty="0" smtClean="0"/>
-              <a:t>, </a:t>
-            </a:r>
-            <a:r>
-              <a:rPr lang="en-US" b="1" dirty="0" smtClean="0"/>
-              <a:t>Link Fields</a:t>
-            </a:r>
-          </a:p>
-          <a:p>
+              <a:t>commands (Inhibit user from messing up </a:t>
+            </a:r>
+            <a:r>
+              <a:rPr lang="en-US" dirty="0" err="1" smtClean="0"/>
+              <a:t>viz</a:t>
+            </a:r>
             <a:r>
               <a:rPr lang="en-US" dirty="0" smtClean="0"/>
-              <a:t>Lay out data elements (Data, Filters, Parameters) Tweak Aesthetics, usability</a:t>
-            </a:r>
-          </a:p>
-          <a:p>
-            <a:pPr lvl="1"/>
+              <a:t>)</a:t>
+            </a:r>
+            <a:endParaRPr lang="en-US" dirty="0"/>
+          </a:p>
+          <a:p>
+            <a:r>
+              <a:rPr lang="en-US" dirty="0"/>
+              <a:t>    Set axis </a:t>
+            </a:r>
             <a:r>
               <a:rPr lang="en-US" dirty="0" smtClean="0"/>
-              <a:t>Color, size, font, tooltips, labels</a:t>
-            </a:r>
-          </a:p>
-          <a:p>
+              <a:t>ranges </a:t>
+            </a:r>
+            <a:r>
+              <a:rPr lang="mr-IN" dirty="0" smtClean="0"/>
+              <a:t>–</a:t>
+            </a:r>
             <a:r>
               <a:rPr lang="en-US" dirty="0" smtClean="0"/>
-              <a:t>Dashboards</a:t>
-            </a:r>
-          </a:p>
-          <a:p>
+              <a:t> Take advantage of your whole canvas</a:t>
+            </a:r>
+          </a:p>
+          <a:p>
+            <a:r>
+              <a:rPr lang="en-US" dirty="0"/>
+              <a:t> </a:t>
+            </a:r>
             <a:r>
               <a:rPr lang="en-US" dirty="0" smtClean="0"/>
-              <a:t>Story (series of dashboards)</a:t>
-            </a:r>
-            <a:endParaRPr lang="en-US" dirty="0"/>
-          </a:p>
-          <a:p>
-            <a:pPr lvl="1"/>
+              <a:t>   Tweak Size &amp; border for objects</a:t>
+            </a:r>
+            <a:endParaRPr lang="en-US" dirty="0"/>
+          </a:p>
+          <a:p>
             <a:endParaRPr lang="en-US" dirty="0"/>
           </a:p>
         </p:txBody>
@@ -7242,7 +7753,7 @@
     </p:spTree>
     <p:extLst>
       <p:ext uri="{BB962C8B-B14F-4D97-AF65-F5344CB8AC3E}">
-        <p14:creationId xmlns:p14="http://schemas.microsoft.com/office/powerpoint/2010/main" val="2120960313"/>
+        <p14:creationId xmlns:p14="http://schemas.microsoft.com/office/powerpoint/2010/main" val="1502686109"/>
       </p:ext>
     </p:extLst>
   </p:cSld>

</xml_diff>